<commit_message>
changes to q star
</commit_message>
<xml_diff>
--- a/q-star.pptx
+++ b/q-star.pptx
@@ -104,6 +104,11 @@
       </a:defRPr>
     </a:lvl9pPr>
   </p:defaultTextStyle>
+  <p:extLst>
+    <p:ext uri="{EFAFB233-063F-42B5-8137-9DF3F51BA10A}">
+      <p15:sldGuideLst xmlns:p15="http://schemas.microsoft.com/office/powerpoint/2012/main"/>
+    </p:ext>
+  </p:extLst>
 </p:presentation>
 </file>
 
@@ -112,16 +117,32 @@
   <pc:docChgLst>
     <pc:chgData name="George John" userId="1c7f5d7288d1a48b" providerId="LiveId" clId="{DD76AF48-72F8-453F-96EF-0481F89B761B}"/>
     <pc:docChg chg="custSel modSld">
-      <pc:chgData name="George John" userId="1c7f5d7288d1a48b" providerId="LiveId" clId="{DD76AF48-72F8-453F-96EF-0481F89B761B}" dt="2023-11-24T00:38:52.443" v="298" actId="1037"/>
+      <pc:chgData name="George John" userId="1c7f5d7288d1a48b" providerId="LiveId" clId="{DD76AF48-72F8-453F-96EF-0481F89B761B}" dt="2023-11-24T01:36:22.487" v="1049" actId="20577"/>
       <pc:docMkLst>
         <pc:docMk/>
       </pc:docMkLst>
       <pc:sldChg chg="addSp delSp modSp mod">
-        <pc:chgData name="George John" userId="1c7f5d7288d1a48b" providerId="LiveId" clId="{DD76AF48-72F8-453F-96EF-0481F89B761B}" dt="2023-11-24T00:38:52.443" v="298" actId="1037"/>
+        <pc:chgData name="George John" userId="1c7f5d7288d1a48b" providerId="LiveId" clId="{DD76AF48-72F8-453F-96EF-0481F89B761B}" dt="2023-11-24T01:36:22.487" v="1049" actId="20577"/>
         <pc:sldMkLst>
           <pc:docMk/>
           <pc:sldMk cId="425731923" sldId="256"/>
         </pc:sldMkLst>
+        <pc:spChg chg="add del">
+          <ac:chgData name="George John" userId="1c7f5d7288d1a48b" providerId="LiveId" clId="{DD76AF48-72F8-453F-96EF-0481F89B761B}" dt="2023-11-24T01:02:51.322" v="301"/>
+          <ac:spMkLst>
+            <pc:docMk/>
+            <pc:sldMk cId="425731923" sldId="256"/>
+            <ac:spMk id="2" creationId="{0656BC5E-ADBF-C1BE-7477-80740FFFDF48}"/>
+          </ac:spMkLst>
+        </pc:spChg>
+        <pc:spChg chg="add del">
+          <ac:chgData name="George John" userId="1c7f5d7288d1a48b" providerId="LiveId" clId="{DD76AF48-72F8-453F-96EF-0481F89B761B}" dt="2023-11-24T01:02:55.969" v="303"/>
+          <ac:spMkLst>
+            <pc:docMk/>
+            <pc:sldMk cId="425731923" sldId="256"/>
+            <ac:spMk id="3" creationId="{06DB4A40-FDAD-2040-DB7A-6B34DDF87518}"/>
+          </ac:spMkLst>
+        </pc:spChg>
         <pc:spChg chg="add mod">
           <ac:chgData name="George John" userId="1c7f5d7288d1a48b" providerId="LiveId" clId="{DD76AF48-72F8-453F-96EF-0481F89B761B}" dt="2023-11-23T21:20:11.627" v="89" actId="1038"/>
           <ac:spMkLst>
@@ -147,7 +168,7 @@
           </ac:spMkLst>
         </pc:spChg>
         <pc:spChg chg="add mod">
-          <ac:chgData name="George John" userId="1c7f5d7288d1a48b" providerId="LiveId" clId="{DD76AF48-72F8-453F-96EF-0481F89B761B}" dt="2023-11-24T00:38:52.443" v="298" actId="1037"/>
+          <ac:chgData name="George John" userId="1c7f5d7288d1a48b" providerId="LiveId" clId="{DD76AF48-72F8-453F-96EF-0481F89B761B}" dt="2023-11-24T01:08:25.349" v="363" actId="20577"/>
           <ac:spMkLst>
             <pc:docMk/>
             <pc:sldMk cId="425731923" sldId="256"/>
@@ -171,7 +192,7 @@
           </ac:spMkLst>
         </pc:spChg>
         <pc:spChg chg="add mod">
-          <ac:chgData name="George John" userId="1c7f5d7288d1a48b" providerId="LiveId" clId="{DD76AF48-72F8-453F-96EF-0481F89B761B}" dt="2023-11-24T00:38:52.443" v="298" actId="1037"/>
+          <ac:chgData name="George John" userId="1c7f5d7288d1a48b" providerId="LiveId" clId="{DD76AF48-72F8-453F-96EF-0481F89B761B}" dt="2023-11-24T01:10:46.513" v="459" actId="113"/>
           <ac:spMkLst>
             <pc:docMk/>
             <pc:sldMk cId="425731923" sldId="256"/>
@@ -179,7 +200,7 @@
           </ac:spMkLst>
         </pc:spChg>
         <pc:spChg chg="add mod">
-          <ac:chgData name="George John" userId="1c7f5d7288d1a48b" providerId="LiveId" clId="{DD76AF48-72F8-453F-96EF-0481F89B761B}" dt="2023-11-24T00:32:46.742" v="282" actId="113"/>
+          <ac:chgData name="George John" userId="1c7f5d7288d1a48b" providerId="LiveId" clId="{DD76AF48-72F8-453F-96EF-0481F89B761B}" dt="2023-11-24T01:35:28.816" v="1033" actId="6549"/>
           <ac:spMkLst>
             <pc:docMk/>
             <pc:sldMk cId="425731923" sldId="256"/>
@@ -187,7 +208,7 @@
           </ac:spMkLst>
         </pc:spChg>
         <pc:spChg chg="add mod">
-          <ac:chgData name="George John" userId="1c7f5d7288d1a48b" providerId="LiveId" clId="{DD76AF48-72F8-453F-96EF-0481F89B761B}" dt="2023-11-23T21:22:12.543" v="187" actId="6549"/>
+          <ac:chgData name="George John" userId="1c7f5d7288d1a48b" providerId="LiveId" clId="{DD76AF48-72F8-453F-96EF-0481F89B761B}" dt="2023-11-24T01:10:49.710" v="460" actId="113"/>
           <ac:spMkLst>
             <pc:docMk/>
             <pc:sldMk cId="425731923" sldId="256"/>
@@ -195,7 +216,7 @@
           </ac:spMkLst>
         </pc:spChg>
         <pc:spChg chg="add mod">
-          <ac:chgData name="George John" userId="1c7f5d7288d1a48b" providerId="LiveId" clId="{DD76AF48-72F8-453F-96EF-0481F89B761B}" dt="2023-11-24T00:38:52.443" v="298" actId="1037"/>
+          <ac:chgData name="George John" userId="1c7f5d7288d1a48b" providerId="LiveId" clId="{DD76AF48-72F8-453F-96EF-0481F89B761B}" dt="2023-11-24T01:08:52.641" v="379" actId="207"/>
           <ac:spMkLst>
             <pc:docMk/>
             <pc:sldMk cId="425731923" sldId="256"/>
@@ -211,7 +232,7 @@
           </ac:spMkLst>
         </pc:spChg>
         <pc:spChg chg="add mod">
-          <ac:chgData name="George John" userId="1c7f5d7288d1a48b" providerId="LiveId" clId="{DD76AF48-72F8-453F-96EF-0481F89B761B}" dt="2023-11-23T21:23:44.864" v="259" actId="1036"/>
+          <ac:chgData name="George John" userId="1c7f5d7288d1a48b" providerId="LiveId" clId="{DD76AF48-72F8-453F-96EF-0481F89B761B}" dt="2023-11-24T01:08:57.970" v="380" actId="207"/>
           <ac:spMkLst>
             <pc:docMk/>
             <pc:sldMk cId="425731923" sldId="256"/>
@@ -226,6 +247,70 @@
             <ac:spMk id="16" creationId="{445F3E2E-36E0-0A52-72C4-6DCEE9F18EEE}"/>
           </ac:spMkLst>
         </pc:spChg>
+        <pc:spChg chg="add mod">
+          <ac:chgData name="George John" userId="1c7f5d7288d1a48b" providerId="LiveId" clId="{DD76AF48-72F8-453F-96EF-0481F89B761B}" dt="2023-11-24T01:18:09.386" v="972" actId="1038"/>
+          <ac:spMkLst>
+            <pc:docMk/>
+            <pc:sldMk cId="425731923" sldId="256"/>
+            <ac:spMk id="20" creationId="{3B532425-81BA-9CAD-BD98-FD1226FAB81A}"/>
+          </ac:spMkLst>
+        </pc:spChg>
+        <pc:spChg chg="add mod">
+          <ac:chgData name="George John" userId="1c7f5d7288d1a48b" providerId="LiveId" clId="{DD76AF48-72F8-453F-96EF-0481F89B761B}" dt="2023-11-24T01:36:22.487" v="1049" actId="20577"/>
+          <ac:spMkLst>
+            <pc:docMk/>
+            <pc:sldMk cId="425731923" sldId="256"/>
+            <ac:spMk id="21" creationId="{B07BD551-89E9-89FC-DF47-F6DF49233C0F}"/>
+          </ac:spMkLst>
+        </pc:spChg>
+        <pc:spChg chg="add mod">
+          <ac:chgData name="George John" userId="1c7f5d7288d1a48b" providerId="LiveId" clId="{DD76AF48-72F8-453F-96EF-0481F89B761B}" dt="2023-11-24T01:18:57.988" v="999" actId="1036"/>
+          <ac:spMkLst>
+            <pc:docMk/>
+            <pc:sldMk cId="425731923" sldId="256"/>
+            <ac:spMk id="22" creationId="{0676F623-2C4C-4D46-F261-D5223A491280}"/>
+          </ac:spMkLst>
+        </pc:spChg>
+        <pc:spChg chg="add mod">
+          <ac:chgData name="George John" userId="1c7f5d7288d1a48b" providerId="LiveId" clId="{DD76AF48-72F8-453F-96EF-0481F89B761B}" dt="2023-11-24T01:19:29.624" v="1001" actId="208"/>
+          <ac:spMkLst>
+            <pc:docMk/>
+            <pc:sldMk cId="425731923" sldId="256"/>
+            <ac:spMk id="23" creationId="{23942D1C-7C45-A085-3BF6-2B0924A69E5B}"/>
+          </ac:spMkLst>
+        </pc:spChg>
+        <pc:spChg chg="add mod">
+          <ac:chgData name="George John" userId="1c7f5d7288d1a48b" providerId="LiveId" clId="{DD76AF48-72F8-453F-96EF-0481F89B761B}" dt="2023-11-24T01:19:36.656" v="1002" actId="208"/>
+          <ac:spMkLst>
+            <pc:docMk/>
+            <pc:sldMk cId="425731923" sldId="256"/>
+            <ac:spMk id="24" creationId="{0CBE1064-F35F-A386-8666-2D8F2884F9C7}"/>
+          </ac:spMkLst>
+        </pc:spChg>
+        <pc:spChg chg="add mod">
+          <ac:chgData name="George John" userId="1c7f5d7288d1a48b" providerId="LiveId" clId="{DD76AF48-72F8-453F-96EF-0481F89B761B}" dt="2023-11-24T01:23:23.008" v="1027" actId="207"/>
+          <ac:spMkLst>
+            <pc:docMk/>
+            <pc:sldMk cId="425731923" sldId="256"/>
+            <ac:spMk id="25" creationId="{EA35CB15-E977-C018-3624-620AE81C8C8D}"/>
+          </ac:spMkLst>
+        </pc:spChg>
+        <pc:picChg chg="add mod">
+          <ac:chgData name="George John" userId="1c7f5d7288d1a48b" providerId="LiveId" clId="{DD76AF48-72F8-453F-96EF-0481F89B761B}" dt="2023-11-24T01:09:22.237" v="381" actId="14861"/>
+          <ac:picMkLst>
+            <pc:docMk/>
+            <pc:sldMk cId="425731923" sldId="256"/>
+            <ac:picMk id="17" creationId="{F9A7906D-C443-6297-10BE-B513BD0C8800}"/>
+          </ac:picMkLst>
+        </pc:picChg>
+        <pc:picChg chg="add mod">
+          <ac:chgData name="George John" userId="1c7f5d7288d1a48b" providerId="LiveId" clId="{DD76AF48-72F8-453F-96EF-0481F89B761B}" dt="2023-11-24T01:09:25.633" v="382" actId="108"/>
+          <ac:picMkLst>
+            <pc:docMk/>
+            <pc:sldMk cId="425731923" sldId="256"/>
+            <ac:picMk id="19" creationId="{273951A6-083F-83B6-C417-83002B9B2ACB}"/>
+          </ac:picMkLst>
+        </pc:picChg>
       </pc:sldChg>
     </pc:docChg>
   </pc:docChgLst>
@@ -3366,7 +3451,7 @@
                   <a:schemeClr val="tx1"/>
                 </a:solidFill>
               </a:rPr>
-              <a:t>Today’s Computer</a:t>
+              <a:t>Digital Computer</a:t>
             </a:r>
           </a:p>
         </p:txBody>
@@ -3448,8 +3533,8 @@
         </p:nvSpPr>
         <p:spPr>
           <a:xfrm>
-            <a:off x="1391362" y="1409295"/>
-            <a:ext cx="1393684" cy="646331"/>
+            <a:off x="1352450" y="1647984"/>
+            <a:ext cx="1393684" cy="369332"/>
           </a:xfrm>
           <a:prstGeom prst="rect">
             <a:avLst/>
@@ -3464,15 +3549,8 @@
           <a:p>
             <a:pPr algn="ctr"/>
             <a:r>
-              <a:rPr lang="en-US" dirty="0"/>
-              <a:t>Today’s </a:t>
-            </a:r>
-          </a:p>
-          <a:p>
-            <a:pPr algn="ctr"/>
-            <a:r>
-              <a:rPr lang="en-US" dirty="0"/>
-              <a:t>AI Speed</a:t>
+              <a:rPr lang="en-US" b="1" dirty="0"/>
+              <a:t>Today</a:t>
             </a:r>
           </a:p>
         </p:txBody>
@@ -3491,8 +3569,8 @@
         </p:nvSpPr>
         <p:spPr>
           <a:xfrm>
-            <a:off x="2148698" y="629689"/>
-            <a:ext cx="2912825" cy="646331"/>
+            <a:off x="1118384" y="918968"/>
+            <a:ext cx="4520415" cy="646331"/>
           </a:xfrm>
           <a:prstGeom prst="rect">
             <a:avLst/>
@@ -3508,7 +3586,7 @@
             <a:pPr algn="ctr"/>
             <a:r>
               <a:rPr lang="en-US" b="1" dirty="0"/>
-              <a:t>How fast is AI when coupled with Quantum Computing?</a:t>
+              <a:t>How fast is todays AI compared with tomorrow’s Quantum AI computing?</a:t>
             </a:r>
           </a:p>
         </p:txBody>
@@ -3527,8 +3605,8 @@
         </p:nvSpPr>
         <p:spPr>
           <a:xfrm>
-            <a:off x="3911534" y="1432474"/>
-            <a:ext cx="1393684" cy="646331"/>
+            <a:off x="3875158" y="1656614"/>
+            <a:ext cx="1393684" cy="369332"/>
           </a:xfrm>
           <a:prstGeom prst="rect">
             <a:avLst/>
@@ -3543,15 +3621,8 @@
           <a:p>
             <a:pPr algn="ctr"/>
             <a:r>
-              <a:rPr lang="en-US" dirty="0"/>
-              <a:t>Tomorrow’s </a:t>
-            </a:r>
-          </a:p>
-          <a:p>
-            <a:pPr algn="ctr"/>
-            <a:r>
-              <a:rPr lang="en-US" dirty="0"/>
-              <a:t>AI Speed</a:t>
+              <a:rPr lang="en-US" b="1" dirty="0"/>
+              <a:t>Tomorrow</a:t>
             </a:r>
           </a:p>
         </p:txBody>
@@ -3586,7 +3657,11 @@
           <a:p>
             <a:pPr algn="ctr"/>
             <a:r>
-              <a:rPr lang="en-US" dirty="0"/>
+              <a:rPr lang="en-US" dirty="0">
+                <a:solidFill>
+                  <a:srgbClr val="0070C0"/>
+                </a:solidFill>
+              </a:rPr>
               <a:t>+</a:t>
             </a:r>
           </a:p>
@@ -3685,7 +3760,11 @@
           <a:p>
             <a:pPr algn="ctr"/>
             <a:r>
-              <a:rPr lang="en-US" dirty="0"/>
+              <a:rPr lang="en-US" dirty="0">
+                <a:solidFill>
+                  <a:srgbClr val="0070C0"/>
+                </a:solidFill>
+              </a:rPr>
               <a:t>+</a:t>
             </a:r>
           </a:p>
@@ -3730,6 +3809,380 @@
             <a:r>
               <a:rPr lang="en-US" dirty="0"/>
               <a:t>AI Speed</a:t>
+            </a:r>
+          </a:p>
+        </p:txBody>
+      </p:sp>
+      <p:pic>
+        <p:nvPicPr>
+          <p:cNvPr id="17" name="Picture 16">
+            <a:extLst>
+              <a:ext uri="{FF2B5EF4-FFF2-40B4-BE49-F238E27FC236}">
+                <a16:creationId xmlns:a16="http://schemas.microsoft.com/office/drawing/2014/main" id="{F9A7906D-C443-6297-10BE-B513BD0C8800}"/>
+              </a:ext>
+            </a:extLst>
+          </p:cNvPr>
+          <p:cNvPicPr>
+            <a:picLocks noChangeAspect="1"/>
+          </p:cNvPicPr>
+          <p:nvPr/>
+        </p:nvPicPr>
+        <p:blipFill>
+          <a:blip r:embed="rId2"/>
+          <a:stretch>
+            <a:fillRect/>
+          </a:stretch>
+        </p:blipFill>
+        <p:spPr>
+          <a:xfrm>
+            <a:off x="1504307" y="4111963"/>
+            <a:ext cx="1295947" cy="1300296"/>
+          </a:xfrm>
+          <a:prstGeom prst="rect">
+            <a:avLst/>
+          </a:prstGeom>
+          <a:effectLst>
+            <a:outerShdw blurRad="50800" dist="38100" dir="8100000" algn="tr" rotWithShape="0">
+              <a:prstClr val="black">
+                <a:alpha val="40000"/>
+              </a:prstClr>
+            </a:outerShdw>
+          </a:effectLst>
+        </p:spPr>
+      </p:pic>
+      <p:pic>
+        <p:nvPicPr>
+          <p:cNvPr id="19" name="Picture 18">
+            <a:extLst>
+              <a:ext uri="{FF2B5EF4-FFF2-40B4-BE49-F238E27FC236}">
+                <a16:creationId xmlns:a16="http://schemas.microsoft.com/office/drawing/2014/main" id="{273951A6-083F-83B6-C417-83002B9B2ACB}"/>
+              </a:ext>
+            </a:extLst>
+          </p:cNvPr>
+          <p:cNvPicPr>
+            <a:picLocks noChangeAspect="1"/>
+          </p:cNvPicPr>
+          <p:nvPr/>
+        </p:nvPicPr>
+        <p:blipFill>
+          <a:blip r:embed="rId3"/>
+          <a:stretch>
+            <a:fillRect/>
+          </a:stretch>
+        </p:blipFill>
+        <p:spPr>
+          <a:xfrm>
+            <a:off x="3961830" y="4131013"/>
+            <a:ext cx="1292702" cy="1233110"/>
+          </a:xfrm>
+          <a:prstGeom prst="rect">
+            <a:avLst/>
+          </a:prstGeom>
+          <a:effectLst>
+            <a:outerShdw blurRad="50800" dist="38100" dir="8100000" algn="tr" rotWithShape="0">
+              <a:prstClr val="black">
+                <a:alpha val="40000"/>
+              </a:prstClr>
+            </a:outerShdw>
+          </a:effectLst>
+        </p:spPr>
+      </p:pic>
+      <p:sp>
+        <p:nvSpPr>
+          <p:cNvPr id="20" name="Rectangle: Rounded Corners 19">
+            <a:extLst>
+              <a:ext uri="{FF2B5EF4-FFF2-40B4-BE49-F238E27FC236}">
+                <a16:creationId xmlns:a16="http://schemas.microsoft.com/office/drawing/2014/main" id="{3B532425-81BA-9CAD-BD98-FD1226FAB81A}"/>
+              </a:ext>
+            </a:extLst>
+          </p:cNvPr>
+          <p:cNvSpPr/>
+          <p:nvPr/>
+        </p:nvSpPr>
+        <p:spPr>
+          <a:xfrm>
+            <a:off x="1199947" y="881536"/>
+            <a:ext cx="4381702" cy="698718"/>
+          </a:xfrm>
+          <a:prstGeom prst="roundRect">
+            <a:avLst/>
+          </a:prstGeom>
+          <a:noFill/>
+          <a:ln>
+            <a:solidFill>
+              <a:schemeClr val="tx1"/>
+            </a:solidFill>
+          </a:ln>
+          <a:effectLst>
+            <a:outerShdw blurRad="50800" dist="38100" dir="8100000" algn="tr" rotWithShape="0">
+              <a:prstClr val="black">
+                <a:alpha val="40000"/>
+              </a:prstClr>
+            </a:outerShdw>
+          </a:effectLst>
+        </p:spPr>
+        <p:style>
+          <a:lnRef idx="2">
+            <a:schemeClr val="accent1">
+              <a:shade val="15000"/>
+            </a:schemeClr>
+          </a:lnRef>
+          <a:fillRef idx="1">
+            <a:schemeClr val="accent1"/>
+          </a:fillRef>
+          <a:effectRef idx="0">
+            <a:schemeClr val="accent1"/>
+          </a:effectRef>
+          <a:fontRef idx="minor">
+            <a:schemeClr val="lt1"/>
+          </a:fontRef>
+        </p:style>
+        <p:txBody>
+          <a:bodyPr rtlCol="0" anchor="ctr"/>
+          <a:lstStyle/>
+          <a:p>
+            <a:pPr algn="ctr"/>
+            <a:endParaRPr lang="en-US" dirty="0">
+              <a:solidFill>
+                <a:schemeClr val="tx1"/>
+              </a:solidFill>
+            </a:endParaRPr>
+          </a:p>
+        </p:txBody>
+      </p:sp>
+      <p:sp>
+        <p:nvSpPr>
+          <p:cNvPr id="21" name="TextBox 20">
+            <a:extLst>
+              <a:ext uri="{FF2B5EF4-FFF2-40B4-BE49-F238E27FC236}">
+                <a16:creationId xmlns:a16="http://schemas.microsoft.com/office/drawing/2014/main" id="{B07BD551-89E9-89FC-DF47-F6DF49233C0F}"/>
+              </a:ext>
+            </a:extLst>
+          </p:cNvPr>
+          <p:cNvSpPr txBox="1"/>
+          <p:nvPr/>
+        </p:nvSpPr>
+        <p:spPr>
+          <a:xfrm>
+            <a:off x="1309291" y="5509412"/>
+            <a:ext cx="4212074" cy="646331"/>
+          </a:xfrm>
+          <a:prstGeom prst="rect">
+            <a:avLst/>
+          </a:prstGeom>
+          <a:noFill/>
+        </p:spPr>
+        <p:txBody>
+          <a:bodyPr wrap="square" rtlCol="0">
+            <a:spAutoFit/>
+          </a:bodyPr>
+          <a:lstStyle/>
+          <a:p>
+            <a:pPr algn="ctr"/>
+            <a:r>
+              <a:rPr lang="en-US" b="1" dirty="0"/>
+              <a:t>Quantum AI computing could be 1,000 to 1 million times faster </a:t>
+            </a:r>
+          </a:p>
+        </p:txBody>
+      </p:sp>
+      <p:sp>
+        <p:nvSpPr>
+          <p:cNvPr id="22" name="Rectangle: Rounded Corners 21">
+            <a:extLst>
+              <a:ext uri="{FF2B5EF4-FFF2-40B4-BE49-F238E27FC236}">
+                <a16:creationId xmlns:a16="http://schemas.microsoft.com/office/drawing/2014/main" id="{0676F623-2C4C-4D46-F261-D5223A491280}"/>
+              </a:ext>
+            </a:extLst>
+          </p:cNvPr>
+          <p:cNvSpPr/>
+          <p:nvPr/>
+        </p:nvSpPr>
+        <p:spPr>
+          <a:xfrm>
+            <a:off x="1305128" y="5505184"/>
+            <a:ext cx="4212074" cy="608997"/>
+          </a:xfrm>
+          <a:prstGeom prst="roundRect">
+            <a:avLst/>
+          </a:prstGeom>
+          <a:noFill/>
+          <a:ln>
+            <a:solidFill>
+              <a:schemeClr val="tx1"/>
+            </a:solidFill>
+          </a:ln>
+          <a:effectLst>
+            <a:outerShdw blurRad="50800" dist="38100" dir="8100000" algn="tr" rotWithShape="0">
+              <a:prstClr val="black">
+                <a:alpha val="40000"/>
+              </a:prstClr>
+            </a:outerShdw>
+          </a:effectLst>
+        </p:spPr>
+        <p:style>
+          <a:lnRef idx="2">
+            <a:schemeClr val="accent1">
+              <a:shade val="15000"/>
+            </a:schemeClr>
+          </a:lnRef>
+          <a:fillRef idx="1">
+            <a:schemeClr val="accent1"/>
+          </a:fillRef>
+          <a:effectRef idx="0">
+            <a:schemeClr val="accent1"/>
+          </a:effectRef>
+          <a:fontRef idx="minor">
+            <a:schemeClr val="lt1"/>
+          </a:fontRef>
+        </p:style>
+        <p:txBody>
+          <a:bodyPr rtlCol="0" anchor="ctr"/>
+          <a:lstStyle/>
+          <a:p>
+            <a:pPr algn="ctr"/>
+            <a:endParaRPr lang="en-US" dirty="0">
+              <a:solidFill>
+                <a:schemeClr val="tx1"/>
+              </a:solidFill>
+            </a:endParaRPr>
+          </a:p>
+        </p:txBody>
+      </p:sp>
+      <p:sp>
+        <p:nvSpPr>
+          <p:cNvPr id="23" name="TextBox 22">
+            <a:extLst>
+              <a:ext uri="{FF2B5EF4-FFF2-40B4-BE49-F238E27FC236}">
+                <a16:creationId xmlns:a16="http://schemas.microsoft.com/office/drawing/2014/main" id="{23942D1C-7C45-A085-3BF6-2B0924A69E5B}"/>
+              </a:ext>
+            </a:extLst>
+          </p:cNvPr>
+          <p:cNvSpPr txBox="1"/>
+          <p:nvPr/>
+        </p:nvSpPr>
+        <p:spPr>
+          <a:xfrm>
+            <a:off x="1188377" y="4225525"/>
+            <a:ext cx="649972" cy="369332"/>
+          </a:xfrm>
+          <a:prstGeom prst="rect">
+            <a:avLst/>
+          </a:prstGeom>
+          <a:solidFill>
+            <a:schemeClr val="bg1">
+              <a:lumMod val="65000"/>
+            </a:schemeClr>
+          </a:solidFill>
+          <a:ln>
+            <a:solidFill>
+              <a:schemeClr val="tx1"/>
+            </a:solidFill>
+          </a:ln>
+        </p:spPr>
+        <p:txBody>
+          <a:bodyPr wrap="square" lIns="0" tIns="0" rIns="0" bIns="0" rtlCol="0">
+            <a:spAutoFit/>
+          </a:bodyPr>
+          <a:lstStyle/>
+          <a:p>
+            <a:pPr algn="ctr"/>
+            <a:r>
+              <a:rPr lang="en-US" sz="2400" b="1" dirty="0">
+                <a:solidFill>
+                  <a:schemeClr val="accent4"/>
+                </a:solidFill>
+              </a:rPr>
+              <a:t>Slow</a:t>
+            </a:r>
+          </a:p>
+        </p:txBody>
+      </p:sp>
+      <p:sp>
+        <p:nvSpPr>
+          <p:cNvPr id="24" name="TextBox 23">
+            <a:extLst>
+              <a:ext uri="{FF2B5EF4-FFF2-40B4-BE49-F238E27FC236}">
+                <a16:creationId xmlns:a16="http://schemas.microsoft.com/office/drawing/2014/main" id="{0CBE1064-F35F-A386-8666-2D8F2884F9C7}"/>
+              </a:ext>
+            </a:extLst>
+          </p:cNvPr>
+          <p:cNvSpPr txBox="1"/>
+          <p:nvPr/>
+        </p:nvSpPr>
+        <p:spPr>
+          <a:xfrm>
+            <a:off x="3489073" y="4213132"/>
+            <a:ext cx="649972" cy="369332"/>
+          </a:xfrm>
+          <a:prstGeom prst="rect">
+            <a:avLst/>
+          </a:prstGeom>
+          <a:solidFill>
+            <a:schemeClr val="bg1">
+              <a:lumMod val="65000"/>
+            </a:schemeClr>
+          </a:solidFill>
+          <a:ln>
+            <a:solidFill>
+              <a:schemeClr val="tx1"/>
+            </a:solidFill>
+          </a:ln>
+        </p:spPr>
+        <p:txBody>
+          <a:bodyPr wrap="square" lIns="0" tIns="0" rIns="0" bIns="0" rtlCol="0">
+            <a:spAutoFit/>
+          </a:bodyPr>
+          <a:lstStyle/>
+          <a:p>
+            <a:pPr algn="ctr"/>
+            <a:r>
+              <a:rPr lang="en-US" sz="2400" b="1" dirty="0">
+                <a:solidFill>
+                  <a:srgbClr val="92D050"/>
+                </a:solidFill>
+              </a:rPr>
+              <a:t>Fast</a:t>
+            </a:r>
+          </a:p>
+        </p:txBody>
+      </p:sp>
+      <p:sp>
+        <p:nvSpPr>
+          <p:cNvPr id="25" name="TextBox 24">
+            <a:extLst>
+              <a:ext uri="{FF2B5EF4-FFF2-40B4-BE49-F238E27FC236}">
+                <a16:creationId xmlns:a16="http://schemas.microsoft.com/office/drawing/2014/main" id="{EA35CB15-E977-C018-3624-620AE81C8C8D}"/>
+              </a:ext>
+            </a:extLst>
+          </p:cNvPr>
+          <p:cNvSpPr txBox="1"/>
+          <p:nvPr/>
+        </p:nvSpPr>
+        <p:spPr>
+          <a:xfrm>
+            <a:off x="3860848" y="1982341"/>
+            <a:ext cx="1393684" cy="369332"/>
+          </a:xfrm>
+          <a:prstGeom prst="rect">
+            <a:avLst/>
+          </a:prstGeom>
+          <a:noFill/>
+        </p:spPr>
+        <p:txBody>
+          <a:bodyPr wrap="square" rtlCol="0">
+            <a:spAutoFit/>
+          </a:bodyPr>
+          <a:lstStyle/>
+          <a:p>
+            <a:pPr algn="ctr"/>
+            <a:r>
+              <a:rPr lang="en-US" b="1" dirty="0">
+                <a:solidFill>
+                  <a:srgbClr val="00B050"/>
+                </a:solidFill>
+              </a:rPr>
+              <a:t>Q-Star</a:t>
             </a:r>
           </a:p>
         </p:txBody>

</xml_diff>